<commit_message>
haciendo practica de regresion lineal
</commit_message>
<xml_diff>
--- a/I. 03 Minería de Datos I/Apuntes.pptx
+++ b/I. 03 Minería de Datos I/Apuntes.pptx
@@ -11,18 +11,14 @@
     <p:sldId id="261" r:id="rId5"/>
     <p:sldId id="262" r:id="rId6"/>
     <p:sldId id="263" r:id="rId7"/>
-    <p:sldId id="264" r:id="rId8"/>
-    <p:sldId id="265" r:id="rId9"/>
-    <p:sldId id="266" r:id="rId10"/>
-    <p:sldId id="267" r:id="rId11"/>
-    <p:sldId id="268" r:id="rId12"/>
-    <p:sldId id="269" r:id="rId13"/>
-    <p:sldId id="270" r:id="rId14"/>
-    <p:sldId id="271" r:id="rId15"/>
-    <p:sldId id="272" r:id="rId16"/>
-    <p:sldId id="273" r:id="rId17"/>
-    <p:sldId id="274" r:id="rId18"/>
-    <p:sldId id="275" r:id="rId19"/>
+    <p:sldId id="268" r:id="rId8"/>
+    <p:sldId id="269" r:id="rId9"/>
+    <p:sldId id="270" r:id="rId10"/>
+    <p:sldId id="271" r:id="rId11"/>
+    <p:sldId id="272" r:id="rId12"/>
+    <p:sldId id="273" r:id="rId13"/>
+    <p:sldId id="274" r:id="rId14"/>
+    <p:sldId id="275" r:id="rId15"/>
   </p:sldIdLst>
   <p:sldSz cx="12192000" cy="6858000"/>
   <p:notesSz cx="6858000" cy="9144000"/>
@@ -121,6 +117,11 @@
       </a:defRPr>
     </a:lvl9pPr>
   </p:defaultTextStyle>
+  <p:extLst>
+    <p:ext uri="{EFAFB233-063F-42B5-8137-9DF3F51BA10A}">
+      <p15:sldGuideLst xmlns:p15="http://schemas.microsoft.com/office/powerpoint/2012/main"/>
+    </p:ext>
+  </p:extLst>
 </p:presentation>
 </file>
 
@@ -255,7 +256,7 @@
           <a:p>
             <a:fld id="{243096E9-D219-4C96-A010-FE899B9589BE}" type="datetimeFigureOut">
               <a:rPr lang="es-BO" smtClean="0"/>
-              <a:t>12/2/2022</a:t>
+              <a:t>19/2/2022</a:t>
             </a:fld>
             <a:endParaRPr lang="es-BO" dirty="0"/>
           </a:p>
@@ -425,7 +426,7 @@
           <a:p>
             <a:fld id="{243096E9-D219-4C96-A010-FE899B9589BE}" type="datetimeFigureOut">
               <a:rPr lang="es-BO" smtClean="0"/>
-              <a:t>12/2/2022</a:t>
+              <a:t>19/2/2022</a:t>
             </a:fld>
             <a:endParaRPr lang="es-BO" dirty="0"/>
           </a:p>
@@ -605,7 +606,7 @@
           <a:p>
             <a:fld id="{243096E9-D219-4C96-A010-FE899B9589BE}" type="datetimeFigureOut">
               <a:rPr lang="es-BO" smtClean="0"/>
-              <a:t>12/2/2022</a:t>
+              <a:t>19/2/2022</a:t>
             </a:fld>
             <a:endParaRPr lang="es-BO" dirty="0"/>
           </a:p>
@@ -775,7 +776,7 @@
           <a:p>
             <a:fld id="{243096E9-D219-4C96-A010-FE899B9589BE}" type="datetimeFigureOut">
               <a:rPr lang="es-BO" smtClean="0"/>
-              <a:t>12/2/2022</a:t>
+              <a:t>19/2/2022</a:t>
             </a:fld>
             <a:endParaRPr lang="es-BO" dirty="0"/>
           </a:p>
@@ -1021,7 +1022,7 @@
           <a:p>
             <a:fld id="{243096E9-D219-4C96-A010-FE899B9589BE}" type="datetimeFigureOut">
               <a:rPr lang="es-BO" smtClean="0"/>
-              <a:t>12/2/2022</a:t>
+              <a:t>19/2/2022</a:t>
             </a:fld>
             <a:endParaRPr lang="es-BO" dirty="0"/>
           </a:p>
@@ -1253,7 +1254,7 @@
           <a:p>
             <a:fld id="{243096E9-D219-4C96-A010-FE899B9589BE}" type="datetimeFigureOut">
               <a:rPr lang="es-BO" smtClean="0"/>
-              <a:t>12/2/2022</a:t>
+              <a:t>19/2/2022</a:t>
             </a:fld>
             <a:endParaRPr lang="es-BO" dirty="0"/>
           </a:p>
@@ -1620,7 +1621,7 @@
           <a:p>
             <a:fld id="{243096E9-D219-4C96-A010-FE899B9589BE}" type="datetimeFigureOut">
               <a:rPr lang="es-BO" smtClean="0"/>
-              <a:t>12/2/2022</a:t>
+              <a:t>19/2/2022</a:t>
             </a:fld>
             <a:endParaRPr lang="es-BO" dirty="0"/>
           </a:p>
@@ -1738,7 +1739,7 @@
           <a:p>
             <a:fld id="{243096E9-D219-4C96-A010-FE899B9589BE}" type="datetimeFigureOut">
               <a:rPr lang="es-BO" smtClean="0"/>
-              <a:t>12/2/2022</a:t>
+              <a:t>19/2/2022</a:t>
             </a:fld>
             <a:endParaRPr lang="es-BO" dirty="0"/>
           </a:p>
@@ -1833,7 +1834,7 @@
           <a:p>
             <a:fld id="{243096E9-D219-4C96-A010-FE899B9589BE}" type="datetimeFigureOut">
               <a:rPr lang="es-BO" smtClean="0"/>
-              <a:t>12/2/2022</a:t>
+              <a:t>19/2/2022</a:t>
             </a:fld>
             <a:endParaRPr lang="es-BO" dirty="0"/>
           </a:p>
@@ -2110,7 +2111,7 @@
           <a:p>
             <a:fld id="{243096E9-D219-4C96-A010-FE899B9589BE}" type="datetimeFigureOut">
               <a:rPr lang="es-BO" smtClean="0"/>
-              <a:t>12/2/2022</a:t>
+              <a:t>19/2/2022</a:t>
             </a:fld>
             <a:endParaRPr lang="es-BO" dirty="0"/>
           </a:p>
@@ -2363,7 +2364,7 @@
           <a:p>
             <a:fld id="{243096E9-D219-4C96-A010-FE899B9589BE}" type="datetimeFigureOut">
               <a:rPr lang="es-BO" smtClean="0"/>
-              <a:t>12/2/2022</a:t>
+              <a:t>19/2/2022</a:t>
             </a:fld>
             <a:endParaRPr lang="es-BO" dirty="0"/>
           </a:p>
@@ -2576,7 +2577,7 @@
           <a:p>
             <a:fld id="{243096E9-D219-4C96-A010-FE899B9589BE}" type="datetimeFigureOut">
               <a:rPr lang="es-BO" smtClean="0"/>
-              <a:t>12/2/2022</a:t>
+              <a:t>19/2/2022</a:t>
             </a:fld>
             <a:endParaRPr lang="es-BO" dirty="0"/>
           </a:p>
@@ -3037,7 +3038,7 @@
       </p:grpSpPr>
       <p:pic>
         <p:nvPicPr>
-          <p:cNvPr id="2" name="Imagen 1"/>
+          <p:cNvPr id="4" name="Imagen 3"/>
           <p:cNvPicPr>
             <a:picLocks noChangeAspect="1"/>
           </p:cNvPicPr>
@@ -3051,8 +3052,32 @@
         </p:blipFill>
         <p:spPr>
           <a:xfrm>
-            <a:off x="-851" y="-43347"/>
-            <a:ext cx="12193702" cy="6944694"/>
+            <a:off x="5866555" y="3765176"/>
+            <a:ext cx="6063704" cy="2707342"/>
+          </a:xfrm>
+          <a:prstGeom prst="rect">
+            <a:avLst/>
+          </a:prstGeom>
+        </p:spPr>
+      </p:pic>
+      <p:pic>
+        <p:nvPicPr>
+          <p:cNvPr id="5" name="Imagen 4"/>
+          <p:cNvPicPr>
+            <a:picLocks noChangeAspect="1"/>
+          </p:cNvPicPr>
+          <p:nvPr/>
+        </p:nvPicPr>
+        <p:blipFill>
+          <a:blip r:embed="rId3"/>
+          <a:stretch>
+            <a:fillRect/>
+          </a:stretch>
+        </p:blipFill>
+        <p:spPr>
+          <a:xfrm>
+            <a:off x="1030941" y="883081"/>
+            <a:ext cx="5163671" cy="2750127"/>
           </a:xfrm>
           <a:prstGeom prst="rect">
             <a:avLst/>
@@ -3062,7 +3087,7 @@
     </p:spTree>
     <p:extLst>
       <p:ext uri="{BB962C8B-B14F-4D97-AF65-F5344CB8AC3E}">
-        <p14:creationId xmlns:p14="http://schemas.microsoft.com/office/powerpoint/2010/main" val="2639426467"/>
+        <p14:creationId xmlns:p14="http://schemas.microsoft.com/office/powerpoint/2010/main" val="3076305460"/>
       </p:ext>
     </p:extLst>
   </p:cSld>
@@ -3105,8 +3130,8 @@
         </p:blipFill>
         <p:spPr>
           <a:xfrm>
-            <a:off x="-615299" y="-14768"/>
-            <a:ext cx="13422598" cy="6887536"/>
+            <a:off x="-272351" y="342469"/>
+            <a:ext cx="12736702" cy="6173061"/>
           </a:xfrm>
           <a:prstGeom prst="rect">
             <a:avLst/>
@@ -3116,7 +3141,7 @@
     </p:spTree>
     <p:extLst>
       <p:ext uri="{BB962C8B-B14F-4D97-AF65-F5344CB8AC3E}">
-        <p14:creationId xmlns:p14="http://schemas.microsoft.com/office/powerpoint/2010/main" val="3335296844"/>
+        <p14:creationId xmlns:p14="http://schemas.microsoft.com/office/powerpoint/2010/main" val="3125889174"/>
       </p:ext>
     </p:extLst>
   </p:cSld>
@@ -3143,34 +3168,10 @@
           <a:chExt cx="0" cy="0"/>
         </a:xfrm>
       </p:grpSpPr>
-      <p:pic>
-        <p:nvPicPr>
-          <p:cNvPr id="2" name="Imagen 1"/>
-          <p:cNvPicPr>
-            <a:picLocks noChangeAspect="1"/>
-          </p:cNvPicPr>
-          <p:nvPr/>
-        </p:nvPicPr>
-        <p:blipFill>
-          <a:blip r:embed="rId2"/>
-          <a:stretch>
-            <a:fillRect/>
-          </a:stretch>
-        </p:blipFill>
-        <p:spPr>
-          <a:xfrm>
-            <a:off x="2104801" y="2369803"/>
-            <a:ext cx="8014171" cy="2584161"/>
-          </a:xfrm>
-          <a:prstGeom prst="rect">
-            <a:avLst/>
-          </a:prstGeom>
-        </p:spPr>
-      </p:pic>
     </p:spTree>
     <p:extLst>
       <p:ext uri="{BB962C8B-B14F-4D97-AF65-F5344CB8AC3E}">
-        <p14:creationId xmlns:p14="http://schemas.microsoft.com/office/powerpoint/2010/main" val="938928111"/>
+        <p14:creationId xmlns:p14="http://schemas.microsoft.com/office/powerpoint/2010/main" val="2690866504"/>
       </p:ext>
     </p:extLst>
   </p:cSld>
@@ -3200,7 +3201,7 @@
     </p:spTree>
     <p:extLst>
       <p:ext uri="{BB962C8B-B14F-4D97-AF65-F5344CB8AC3E}">
-        <p14:creationId xmlns:p14="http://schemas.microsoft.com/office/powerpoint/2010/main" val="2075125226"/>
+        <p14:creationId xmlns:p14="http://schemas.microsoft.com/office/powerpoint/2010/main" val="4113427191"/>
       </p:ext>
     </p:extLst>
   </p:cSld>
@@ -3211,126 +3212,6 @@
 </file>
 
 <file path=ppt/slides/slide14.xml><?xml version="1.0" encoding="utf-8"?>
-<p:sld xmlns:a="http://schemas.openxmlformats.org/drawingml/2006/main" xmlns:r="http://schemas.openxmlformats.org/officeDocument/2006/relationships" xmlns:p="http://schemas.openxmlformats.org/presentationml/2006/main">
-  <p:cSld>
-    <p:spTree>
-      <p:nvGrpSpPr>
-        <p:cNvPr id="1" name=""/>
-        <p:cNvGrpSpPr/>
-        <p:nvPr/>
-      </p:nvGrpSpPr>
-      <p:grpSpPr>
-        <a:xfrm>
-          <a:off x="0" y="0"/>
-          <a:ext cx="0" cy="0"/>
-          <a:chOff x="0" y="0"/>
-          <a:chExt cx="0" cy="0"/>
-        </a:xfrm>
-      </p:grpSpPr>
-    </p:spTree>
-    <p:extLst>
-      <p:ext uri="{BB962C8B-B14F-4D97-AF65-F5344CB8AC3E}">
-        <p14:creationId xmlns:p14="http://schemas.microsoft.com/office/powerpoint/2010/main" val="3076305460"/>
-      </p:ext>
-    </p:extLst>
-  </p:cSld>
-  <p:clrMapOvr>
-    <a:masterClrMapping/>
-  </p:clrMapOvr>
-</p:sld>
-</file>
-
-<file path=ppt/slides/slide15.xml><?xml version="1.0" encoding="utf-8"?>
-<p:sld xmlns:a="http://schemas.openxmlformats.org/drawingml/2006/main" xmlns:r="http://schemas.openxmlformats.org/officeDocument/2006/relationships" xmlns:p="http://schemas.openxmlformats.org/presentationml/2006/main">
-  <p:cSld>
-    <p:spTree>
-      <p:nvGrpSpPr>
-        <p:cNvPr id="1" name=""/>
-        <p:cNvGrpSpPr/>
-        <p:nvPr/>
-      </p:nvGrpSpPr>
-      <p:grpSpPr>
-        <a:xfrm>
-          <a:off x="0" y="0"/>
-          <a:ext cx="0" cy="0"/>
-          <a:chOff x="0" y="0"/>
-          <a:chExt cx="0" cy="0"/>
-        </a:xfrm>
-      </p:grpSpPr>
-    </p:spTree>
-    <p:extLst>
-      <p:ext uri="{BB962C8B-B14F-4D97-AF65-F5344CB8AC3E}">
-        <p14:creationId xmlns:p14="http://schemas.microsoft.com/office/powerpoint/2010/main" val="3125889174"/>
-      </p:ext>
-    </p:extLst>
-  </p:cSld>
-  <p:clrMapOvr>
-    <a:masterClrMapping/>
-  </p:clrMapOvr>
-</p:sld>
-</file>
-
-<file path=ppt/slides/slide16.xml><?xml version="1.0" encoding="utf-8"?>
-<p:sld xmlns:a="http://schemas.openxmlformats.org/drawingml/2006/main" xmlns:r="http://schemas.openxmlformats.org/officeDocument/2006/relationships" xmlns:p="http://schemas.openxmlformats.org/presentationml/2006/main">
-  <p:cSld>
-    <p:spTree>
-      <p:nvGrpSpPr>
-        <p:cNvPr id="1" name=""/>
-        <p:cNvGrpSpPr/>
-        <p:nvPr/>
-      </p:nvGrpSpPr>
-      <p:grpSpPr>
-        <a:xfrm>
-          <a:off x="0" y="0"/>
-          <a:ext cx="0" cy="0"/>
-          <a:chOff x="0" y="0"/>
-          <a:chExt cx="0" cy="0"/>
-        </a:xfrm>
-      </p:grpSpPr>
-    </p:spTree>
-    <p:extLst>
-      <p:ext uri="{BB962C8B-B14F-4D97-AF65-F5344CB8AC3E}">
-        <p14:creationId xmlns:p14="http://schemas.microsoft.com/office/powerpoint/2010/main" val="2690866504"/>
-      </p:ext>
-    </p:extLst>
-  </p:cSld>
-  <p:clrMapOvr>
-    <a:masterClrMapping/>
-  </p:clrMapOvr>
-</p:sld>
-</file>
-
-<file path=ppt/slides/slide17.xml><?xml version="1.0" encoding="utf-8"?>
-<p:sld xmlns:a="http://schemas.openxmlformats.org/drawingml/2006/main" xmlns:r="http://schemas.openxmlformats.org/officeDocument/2006/relationships" xmlns:p="http://schemas.openxmlformats.org/presentationml/2006/main">
-  <p:cSld>
-    <p:spTree>
-      <p:nvGrpSpPr>
-        <p:cNvPr id="1" name=""/>
-        <p:cNvGrpSpPr/>
-        <p:nvPr/>
-      </p:nvGrpSpPr>
-      <p:grpSpPr>
-        <a:xfrm>
-          <a:off x="0" y="0"/>
-          <a:ext cx="0" cy="0"/>
-          <a:chOff x="0" y="0"/>
-          <a:chExt cx="0" cy="0"/>
-        </a:xfrm>
-      </p:grpSpPr>
-    </p:spTree>
-    <p:extLst>
-      <p:ext uri="{BB962C8B-B14F-4D97-AF65-F5344CB8AC3E}">
-        <p14:creationId xmlns:p14="http://schemas.microsoft.com/office/powerpoint/2010/main" val="4113427191"/>
-      </p:ext>
-    </p:extLst>
-  </p:cSld>
-  <p:clrMapOvr>
-    <a:masterClrMapping/>
-  </p:clrMapOvr>
-</p:sld>
-</file>
-
-<file path=ppt/slides/slide18.xml><?xml version="1.0" encoding="utf-8"?>
 <p:sld xmlns:a="http://schemas.openxmlformats.org/drawingml/2006/main" xmlns:r="http://schemas.openxmlformats.org/officeDocument/2006/relationships" xmlns:p="http://schemas.openxmlformats.org/presentationml/2006/main">
   <p:cSld>
     <p:spTree>
@@ -3687,8 +3568,8 @@
         </p:blipFill>
         <p:spPr>
           <a:xfrm>
-            <a:off x="714603" y="715251"/>
-            <a:ext cx="10570713" cy="5529849"/>
+            <a:off x="-615299" y="-14768"/>
+            <a:ext cx="13422598" cy="6887536"/>
           </a:xfrm>
           <a:prstGeom prst="rect">
             <a:avLst/>
@@ -3698,7 +3579,7 @@
     </p:spTree>
     <p:extLst>
       <p:ext uri="{BB962C8B-B14F-4D97-AF65-F5344CB8AC3E}">
-        <p14:creationId xmlns:p14="http://schemas.microsoft.com/office/powerpoint/2010/main" val="2377077941"/>
+        <p14:creationId xmlns:p14="http://schemas.microsoft.com/office/powerpoint/2010/main" val="3335296844"/>
       </p:ext>
     </p:extLst>
   </p:cSld>
@@ -3741,8 +3622,8 @@
         </p:blipFill>
         <p:spPr>
           <a:xfrm>
-            <a:off x="404018" y="37626"/>
-            <a:ext cx="11383964" cy="6782747"/>
+            <a:off x="2104801" y="2369803"/>
+            <a:ext cx="8014171" cy="2584161"/>
           </a:xfrm>
           <a:prstGeom prst="rect">
             <a:avLst/>
@@ -3752,7 +3633,7 @@
     </p:spTree>
     <p:extLst>
       <p:ext uri="{BB962C8B-B14F-4D97-AF65-F5344CB8AC3E}">
-        <p14:creationId xmlns:p14="http://schemas.microsoft.com/office/powerpoint/2010/main" val="1321952614"/>
+        <p14:creationId xmlns:p14="http://schemas.microsoft.com/office/powerpoint/2010/main" val="938928111"/>
       </p:ext>
     </p:extLst>
   </p:cSld>
@@ -3779,34 +3660,40 @@
           <a:chExt cx="0" cy="0"/>
         </a:xfrm>
       </p:grpSpPr>
-      <p:pic>
-        <p:nvPicPr>
-          <p:cNvPr id="2" name="Imagen 1"/>
-          <p:cNvPicPr>
-            <a:picLocks noChangeAspect="1"/>
-          </p:cNvPicPr>
+      <p:sp>
+        <p:nvSpPr>
+          <p:cNvPr id="2" name="CuadroTexto 1"/>
+          <p:cNvSpPr txBox="1"/>
           <p:nvPr/>
-        </p:nvPicPr>
-        <p:blipFill>
-          <a:blip r:embed="rId2"/>
-          <a:stretch>
-            <a:fillRect/>
-          </a:stretch>
-        </p:blipFill>
+        </p:nvSpPr>
         <p:spPr>
           <a:xfrm>
-            <a:off x="346860" y="90021"/>
-            <a:ext cx="11498280" cy="6677957"/>
+            <a:off x="2868706" y="2447365"/>
+            <a:ext cx="773610" cy="369332"/>
           </a:xfrm>
           <a:prstGeom prst="rect">
             <a:avLst/>
           </a:prstGeom>
+          <a:noFill/>
         </p:spPr>
-      </p:pic>
+        <p:txBody>
+          <a:bodyPr wrap="none" rtlCol="0">
+            <a:spAutoFit/>
+          </a:bodyPr>
+          <a:lstStyle/>
+          <a:p>
+            <a:r>
+              <a:rPr lang="es-BO" dirty="0" smtClean="0"/>
+              <a:t>19 feb</a:t>
+            </a:r>
+            <a:endParaRPr lang="es-BO" dirty="0"/>
+          </a:p>
+        </p:txBody>
+      </p:sp>
     </p:spTree>
     <p:extLst>
       <p:ext uri="{BB962C8B-B14F-4D97-AF65-F5344CB8AC3E}">
-        <p14:creationId xmlns:p14="http://schemas.microsoft.com/office/powerpoint/2010/main" val="2988319674"/>
+        <p14:creationId xmlns:p14="http://schemas.microsoft.com/office/powerpoint/2010/main" val="2075125226"/>
       </p:ext>
     </p:extLst>
   </p:cSld>

</xml_diff>